<commit_message>
added a docker file
</commit_message>
<xml_diff>
--- a/rapport/Présentation_Finale.pptx
+++ b/rapport/Présentation_Finale.pptx
@@ -22424,7 +22424,7 @@
                 <a:latin typeface="Courier New"/>
                 <a:cs typeface="Courier New"/>
               </a:rPr>
-              <a:t>100</a:t>
+              <a:t>101</a:t>
             </a:r>
             <a:endParaRPr lang="fr-FR" sz="1150" b="1" dirty="0">
               <a:latin typeface="Courier New"/>
@@ -22714,7 +22714,7 @@
         <p:spPr>
           <a:xfrm>
             <a:off x="569775" y="1065906"/>
-            <a:ext cx="7577455" cy="1382430"/>
+            <a:ext cx="7577455" cy="1936428"/>
           </a:xfrm>
           <a:prstGeom prst="rect">
             <a:avLst/>
@@ -22851,6 +22851,47 @@
                 <a:cs typeface="Calibri"/>
               </a:rPr>
               <a:t>, Items … </a:t>
+            </a:r>
+          </a:p>
+          <a:p>
+            <a:pPr marL="469900" indent="-367030">
+              <a:lnSpc>
+                <a:spcPct val="100000"/>
+              </a:lnSpc>
+              <a:buFont typeface="Arial MT"/>
+              <a:buChar char="●"/>
+              <a:tabLst>
+                <a:tab pos="469265" algn="l"/>
+                <a:tab pos="469900" algn="l"/>
+                <a:tab pos="4347845" algn="l"/>
+                <a:tab pos="4714875" algn="l"/>
+              </a:tabLst>
+            </a:pPr>
+            <a:endParaRPr lang="fr-FR" sz="1800" spc="55" dirty="0">
+              <a:latin typeface="Calibri"/>
+              <a:cs typeface="Calibri"/>
+            </a:endParaRPr>
+          </a:p>
+          <a:p>
+            <a:pPr marL="469900" indent="-367030">
+              <a:lnSpc>
+                <a:spcPct val="100000"/>
+              </a:lnSpc>
+              <a:buFont typeface="Arial MT"/>
+              <a:buChar char="●"/>
+              <a:tabLst>
+                <a:tab pos="469265" algn="l"/>
+                <a:tab pos="469900" algn="l"/>
+                <a:tab pos="4347845" algn="l"/>
+                <a:tab pos="4714875" algn="l"/>
+              </a:tabLst>
+            </a:pPr>
+            <a:r>
+              <a:rPr lang="fr-FR" sz="1800" spc="55">
+                <a:latin typeface="Calibri"/>
+                <a:cs typeface="Calibri"/>
+              </a:rPr>
+              <a:t>Forme conjonctif ?</a:t>
             </a:r>
             <a:r>
               <a:rPr sz="1800" spc="30" dirty="0">

</xml_diff>